<commit_message>
adding the phone pic which is missing in architect design slide
</commit_message>
<xml_diff>
--- a/Smart Water Bottle.pptx
+++ b/Smart Water Bottle.pptx
@@ -5705,6 +5705,96 @@
           </a:extLst>
         </p:spPr>
       </p:pic>
+      <p:pic>
+        <p:nvPicPr>
+          <p:cNvPr id="1026" name="Picture 2"/>
+          <p:cNvPicPr>
+            <a:picLocks noChangeAspect="1" noChangeArrowheads="1"/>
+          </p:cNvPicPr>
+          <p:nvPr/>
+        </p:nvPicPr>
+        <p:blipFill>
+          <a:blip r:embed="rId10" cstate="print">
+            <a:extLst>
+              <a:ext uri="{28A0092B-C50C-407E-A947-70E740481C1C}">
+                <a14:useLocalDpi xmlns:a14="http://schemas.microsoft.com/office/drawing/2010/main" val="0"/>
+              </a:ext>
+            </a:extLst>
+          </a:blip>
+          <a:srcRect/>
+          <a:stretch>
+            <a:fillRect/>
+          </a:stretch>
+        </p:blipFill>
+        <p:spPr bwMode="auto">
+          <a:xfrm rot="2103618">
+            <a:off x="7842406" y="1658041"/>
+            <a:ext cx="681597" cy="1520249"/>
+          </a:xfrm>
+          <a:prstGeom prst="rect">
+            <a:avLst/>
+          </a:prstGeom>
+          <a:noFill/>
+          <a:ln>
+            <a:noFill/>
+          </a:ln>
+          <a:extLst>
+            <a:ext uri="{909E8E84-426E-40DD-AFC4-6F175D3DCCD1}">
+              <a14:hiddenFill xmlns:a14="http://schemas.microsoft.com/office/drawing/2010/main">
+                <a:solidFill>
+                  <a:schemeClr val="accent1"/>
+                </a:solidFill>
+              </a14:hiddenFill>
+            </a:ext>
+            <a:ext uri="{91240B29-F687-4F45-9708-019B960494DF}">
+              <a14:hiddenLine xmlns:a14="http://schemas.microsoft.com/office/drawing/2010/main" w="9525">
+                <a:solidFill>
+                  <a:schemeClr val="tx1"/>
+                </a:solidFill>
+                <a:miter lim="800000"/>
+                <a:headEnd/>
+                <a:tailEnd/>
+              </a14:hiddenLine>
+            </a:ext>
+          </a:extLst>
+        </p:spPr>
+      </p:pic>
+      <p:cxnSp>
+        <p:nvCxnSpPr>
+          <p:cNvPr id="16" name="رابط كسهم مستقيم 15"/>
+          <p:cNvCxnSpPr/>
+          <p:nvPr/>
+        </p:nvCxnSpPr>
+        <p:spPr>
+          <a:xfrm>
+            <a:off x="5753100" y="1752599"/>
+            <a:ext cx="2058828" cy="609601"/>
+          </a:xfrm>
+          <a:prstGeom prst="straightConnector1">
+            <a:avLst/>
+          </a:prstGeom>
+          <a:ln w="12700" cmpd="sng">
+            <a:solidFill>
+              <a:schemeClr val="tx1"/>
+            </a:solidFill>
+            <a:tailEnd type="arrow"/>
+          </a:ln>
+        </p:spPr>
+        <p:style>
+          <a:lnRef idx="1">
+            <a:schemeClr val="accent1"/>
+          </a:lnRef>
+          <a:fillRef idx="0">
+            <a:schemeClr val="accent1"/>
+          </a:fillRef>
+          <a:effectRef idx="0">
+            <a:schemeClr val="accent1"/>
+          </a:effectRef>
+          <a:fontRef idx="minor">
+            <a:schemeClr val="tx1"/>
+          </a:fontRef>
+        </p:style>
+      </p:cxnSp>
     </p:spTree>
     <p:extLst>
       <p:ext uri="{BB962C8B-B14F-4D97-AF65-F5344CB8AC3E}">
@@ -6336,18 +6426,22 @@
             <a:pPr marL="109728" indent="0">
               <a:buNone/>
             </a:pPr>
-            <a:endParaRPr lang="en-US" dirty="0"/>
-          </a:p>
-          <a:p>
-            <a:pPr marL="109728" indent="0">
-              <a:buNone/>
-            </a:pPr>
             <a:endParaRPr lang="en-US" dirty="0" smtClean="0"/>
           </a:p>
           <a:p>
             <a:r>
               <a:rPr lang="en-US" dirty="0" smtClean="0"/>
-              <a:t>Reminder service</a:t>
+              <a:t>Reminder </a:t>
+            </a:r>
+            <a:r>
+              <a:rPr lang="en-US" dirty="0" smtClean="0"/>
+              <a:t>service</a:t>
+            </a:r>
+          </a:p>
+          <a:p>
+            <a:r>
+              <a:rPr lang="en-US" dirty="0" smtClean="0"/>
+              <a:t>Status Monitor </a:t>
             </a:r>
             <a:endParaRPr lang="ar-SA" dirty="0"/>
           </a:p>
@@ -6588,15 +6682,7 @@
           <a:p>
             <a:r>
               <a:rPr lang="en-US" dirty="0" smtClean="0"/>
-              <a:t>From What’s IOT ? tell building a </a:t>
-            </a:r>
-            <a:r>
-              <a:rPr lang="en-US" dirty="0" smtClean="0"/>
-              <a:t>product</a:t>
-            </a:r>
-            <a:r>
-              <a:rPr lang="en-US" dirty="0" smtClean="0"/>
-              <a:t>.  </a:t>
+              <a:t>From What’s IOT ? tell building a product.  </a:t>
             </a:r>
             <a:endParaRPr lang="ar-SA" dirty="0"/>
           </a:p>

</xml_diff>